<commit_message>
- Week 9 content
</commit_message>
<xml_diff>
--- a/lectures/week9/lecture3/slides/week9_lecture3.pptx
+++ b/lectures/week9/lecture3/slides/week9_lecture3.pptx
@@ -2,7 +2,7 @@
 <file path=ppt/presentation.xml><?xml version="1.0" encoding="utf-8"?>
 <p:presentation xmlns:a="http://schemas.openxmlformats.org/drawingml/2006/main" xmlns:r="http://schemas.openxmlformats.org/officeDocument/2006/relationships" xmlns:p="http://schemas.openxmlformats.org/presentationml/2006/main" saveSubsetFonts="1">
   <p:sldMasterIdLst>
-    <p:sldMasterId id="2147483665" r:id="rId1"/>
+    <p:sldMasterId id="2147483670" r:id="rId1"/>
   </p:sldMasterIdLst>
   <p:sldIdLst>
     <p:sldId id="256" r:id="rId2"/>
@@ -231,7 +231,7 @@
           <p:cNvPr id="2" name="Title 1">
             <a:extLst>
               <a:ext uri="{FF2B5EF4-FFF2-40B4-BE49-F238E27FC236}">
-                <a16:creationId xmlns:a16="http://schemas.microsoft.com/office/drawing/2014/main" id="{8C70E9A4-6E61-4AF5-9711-A3D313611356}"/>
+                <a16:creationId xmlns:a16="http://schemas.microsoft.com/office/drawing/2014/main" id="{45F8F638-606D-A22E-8F9F-A4A6D858EDA6}"/>
               </a:ext>
             </a:extLst>
           </p:cNvPr>
@@ -244,17 +244,15 @@
         </p:nvSpPr>
         <p:spPr>
           <a:xfrm>
-            <a:off x="335947" y="2409479"/>
+            <a:off x="335947" y="3285779"/>
             <a:ext cx="11391065" cy="893580"/>
           </a:xfrm>
         </p:spPr>
         <p:txBody>
-          <a:bodyPr anchor="b">
-            <a:normAutofit/>
-          </a:bodyPr>
+          <a:bodyPr/>
           <a:lstStyle>
-            <a:lvl1pPr algn="l">
-              <a:defRPr sz="4800">
+            <a:lvl1pPr>
+              <a:defRPr>
                 <a:solidFill>
                   <a:srgbClr val="FFFFFF"/>
                 </a:solidFill>
@@ -266,7 +264,7 @@
               <a:rPr lang="en-US"/>
               <a:t>Click to edit Master title style</a:t>
             </a:r>
-            <a:endParaRPr lang="en-CA" dirty="0"/>
+            <a:endParaRPr lang="en-US" dirty="0"/>
           </a:p>
         </p:txBody>
       </p:sp>
@@ -275,7 +273,7 @@
           <p:cNvPr id="3" name="Subtitle 2">
             <a:extLst>
               <a:ext uri="{FF2B5EF4-FFF2-40B4-BE49-F238E27FC236}">
-                <a16:creationId xmlns:a16="http://schemas.microsoft.com/office/drawing/2014/main" id="{959B255B-D275-45F6-ACB5-BBD491BB4ADD}"/>
+                <a16:creationId xmlns:a16="http://schemas.microsoft.com/office/drawing/2014/main" id="{4EB4BAB1-A261-2102-CEA9-063F697A42AF}"/>
               </a:ext>
             </a:extLst>
           </p:cNvPr>
@@ -288,70 +286,35 @@
         </p:nvSpPr>
         <p:spPr>
           <a:xfrm>
-            <a:off x="335947" y="3848999"/>
+            <a:off x="335947" y="4553849"/>
             <a:ext cx="11391065" cy="1655762"/>
           </a:xfrm>
-          <a:prstGeom prst="rect">
-            <a:avLst/>
-          </a:prstGeom>
         </p:spPr>
         <p:txBody>
           <a:bodyPr/>
           <a:lstStyle>
-            <a:lvl1pPr marL="0" indent="0" algn="l">
+            <a:lvl1pPr marL="0" indent="0">
               <a:buNone/>
-              <a:defRPr sz="2400">
+              <a:defRPr>
                 <a:solidFill>
                   <a:srgbClr val="FFFFFF"/>
                 </a:solidFill>
               </a:defRPr>
             </a:lvl1pPr>
-            <a:lvl2pPr marL="457200" indent="0" algn="ctr">
-              <a:buNone/>
-              <a:defRPr sz="2000"/>
-            </a:lvl2pPr>
-            <a:lvl3pPr marL="914400" indent="0" algn="ctr">
-              <a:buNone/>
-              <a:defRPr sz="1800"/>
-            </a:lvl3pPr>
-            <a:lvl4pPr marL="1371600" indent="0" algn="ctr">
-              <a:buNone/>
-              <a:defRPr sz="1600"/>
-            </a:lvl4pPr>
-            <a:lvl5pPr marL="1828800" indent="0" algn="ctr">
-              <a:buNone/>
-              <a:defRPr sz="1600"/>
-            </a:lvl5pPr>
-            <a:lvl6pPr marL="2286000" indent="0" algn="ctr">
-              <a:buNone/>
-              <a:defRPr sz="1600"/>
-            </a:lvl6pPr>
-            <a:lvl7pPr marL="2743200" indent="0" algn="ctr">
-              <a:buNone/>
-              <a:defRPr sz="1600"/>
-            </a:lvl7pPr>
-            <a:lvl8pPr marL="3200400" indent="0" algn="ctr">
-              <a:buNone/>
-              <a:defRPr sz="1600"/>
-            </a:lvl8pPr>
-            <a:lvl9pPr marL="3657600" indent="0" algn="ctr">
-              <a:buNone/>
-              <a:defRPr sz="1600"/>
-            </a:lvl9pPr>
           </a:lstStyle>
           <a:p>
             <a:r>
               <a:rPr lang="en-US"/>
               <a:t>Click to edit Master subtitle style</a:t>
             </a:r>
-            <a:endParaRPr lang="en-CA"/>
+            <a:endParaRPr lang="en-US" dirty="0"/>
           </a:p>
         </p:txBody>
       </p:sp>
     </p:spTree>
     <p:extLst>
       <p:ext uri="{BB962C8B-B14F-4D97-AF65-F5344CB8AC3E}">
-        <p14:creationId xmlns:p14="http://schemas.microsoft.com/office/powerpoint/2010/main" val="1898934703"/>
+        <p14:creationId xmlns:p14="http://schemas.microsoft.com/office/powerpoint/2010/main" val="4163361328"/>
       </p:ext>
     </p:extLst>
   </p:cSld>
@@ -458,6 +421,9 @@
           <a:bodyPr/>
           <a:lstStyle>
             <a:lvl1pPr>
+              <a:buClr>
+                <a:schemeClr val="accent2"/>
+              </a:buClr>
               <a:defRPr>
                 <a:solidFill>
                   <a:srgbClr val="444445"/>
@@ -465,6 +431,9 @@
               </a:defRPr>
             </a:lvl1pPr>
             <a:lvl2pPr>
+              <a:buClr>
+                <a:schemeClr val="accent2"/>
+              </a:buClr>
               <a:defRPr>
                 <a:solidFill>
                   <a:srgbClr val="444445"/>
@@ -472,6 +441,9 @@
               </a:defRPr>
             </a:lvl2pPr>
             <a:lvl3pPr>
+              <a:buClr>
+                <a:schemeClr val="accent2"/>
+              </a:buClr>
               <a:defRPr>
                 <a:solidFill>
                   <a:srgbClr val="444445"/>
@@ -479,6 +451,9 @@
               </a:defRPr>
             </a:lvl3pPr>
             <a:lvl4pPr>
+              <a:buClr>
+                <a:schemeClr val="accent2"/>
+              </a:buClr>
               <a:defRPr>
                 <a:solidFill>
                   <a:srgbClr val="444445"/>
@@ -486,6 +461,9 @@
               </a:defRPr>
             </a:lvl4pPr>
             <a:lvl5pPr>
+              <a:buClr>
+                <a:schemeClr val="accent2"/>
+              </a:buClr>
               <a:defRPr>
                 <a:solidFill>
                   <a:srgbClr val="444445"/>
@@ -497,7 +475,7 @@
             <a:pPr lvl="0"/>
             <a:r>
               <a:rPr lang="en-US"/>
-              <a:t>Edit Master text styles</a:t>
+              <a:t>Click to edit Master text styles</a:t>
             </a:r>
           </a:p>
           <a:p>
@@ -527,14 +505,14 @@
               <a:rPr lang="en-US"/>
               <a:t>Fifth level</a:t>
             </a:r>
-            <a:endParaRPr lang="en-CA"/>
+            <a:endParaRPr lang="en-CA" dirty="0"/>
           </a:p>
         </p:txBody>
       </p:sp>
     </p:spTree>
     <p:extLst>
       <p:ext uri="{BB962C8B-B14F-4D97-AF65-F5344CB8AC3E}">
-        <p14:creationId xmlns:p14="http://schemas.microsoft.com/office/powerpoint/2010/main" val="3979519265"/>
+        <p14:creationId xmlns:p14="http://schemas.microsoft.com/office/powerpoint/2010/main" val="3997124505"/>
       </p:ext>
     </p:extLst>
   </p:cSld>
@@ -641,6 +619,9 @@
           <a:bodyPr/>
           <a:lstStyle>
             <a:lvl1pPr>
+              <a:buClr>
+                <a:schemeClr val="accent6"/>
+              </a:buClr>
               <a:defRPr>
                 <a:solidFill>
                   <a:srgbClr val="FFFFFF"/>
@@ -648,6 +629,9 @@
               </a:defRPr>
             </a:lvl1pPr>
             <a:lvl2pPr>
+              <a:buClr>
+                <a:schemeClr val="accent6"/>
+              </a:buClr>
               <a:defRPr>
                 <a:solidFill>
                   <a:srgbClr val="FFFFFF"/>
@@ -655,6 +639,9 @@
               </a:defRPr>
             </a:lvl2pPr>
             <a:lvl3pPr>
+              <a:buClr>
+                <a:schemeClr val="accent6"/>
+              </a:buClr>
               <a:defRPr>
                 <a:solidFill>
                   <a:srgbClr val="FFFFFF"/>
@@ -662,6 +649,9 @@
               </a:defRPr>
             </a:lvl3pPr>
             <a:lvl4pPr>
+              <a:buClr>
+                <a:schemeClr val="accent6"/>
+              </a:buClr>
               <a:defRPr>
                 <a:solidFill>
                   <a:srgbClr val="FFFFFF"/>
@@ -669,6 +659,9 @@
               </a:defRPr>
             </a:lvl4pPr>
             <a:lvl5pPr>
+              <a:buClr>
+                <a:schemeClr val="accent6"/>
+              </a:buClr>
               <a:defRPr>
                 <a:solidFill>
                   <a:srgbClr val="FFFFFF"/>
@@ -680,7 +673,7 @@
             <a:pPr lvl="0"/>
             <a:r>
               <a:rPr lang="en-US"/>
-              <a:t>Edit Master text styles</a:t>
+              <a:t>Click to edit Master text styles</a:t>
             </a:r>
           </a:p>
           <a:p>
@@ -717,7 +710,7 @@
     </p:spTree>
     <p:extLst>
       <p:ext uri="{BB962C8B-B14F-4D97-AF65-F5344CB8AC3E}">
-        <p14:creationId xmlns:p14="http://schemas.microsoft.com/office/powerpoint/2010/main" val="309569737"/>
+        <p14:creationId xmlns:p14="http://schemas.microsoft.com/office/powerpoint/2010/main" val="2548035045"/>
       </p:ext>
     </p:extLst>
   </p:cSld>
@@ -825,7 +818,7 @@
           <a:lstStyle>
             <a:lvl1pPr>
               <a:buClr>
-                <a:schemeClr val="tx1"/>
+                <a:schemeClr val="accent6"/>
               </a:buClr>
               <a:defRPr>
                 <a:solidFill>
@@ -835,7 +828,7 @@
             </a:lvl1pPr>
             <a:lvl2pPr>
               <a:buClr>
-                <a:schemeClr val="tx1"/>
+                <a:schemeClr val="accent6"/>
               </a:buClr>
               <a:defRPr>
                 <a:solidFill>
@@ -845,7 +838,7 @@
             </a:lvl2pPr>
             <a:lvl3pPr>
               <a:buClr>
-                <a:schemeClr val="tx1"/>
+                <a:schemeClr val="accent6"/>
               </a:buClr>
               <a:defRPr>
                 <a:solidFill>
@@ -855,7 +848,7 @@
             </a:lvl3pPr>
             <a:lvl4pPr>
               <a:buClr>
-                <a:schemeClr val="tx1"/>
+                <a:schemeClr val="accent6"/>
               </a:buClr>
               <a:defRPr>
                 <a:solidFill>
@@ -865,7 +858,7 @@
             </a:lvl4pPr>
             <a:lvl5pPr>
               <a:buClr>
-                <a:schemeClr val="tx1"/>
+                <a:schemeClr val="accent6"/>
               </a:buClr>
               <a:defRPr>
                 <a:solidFill>
@@ -878,7 +871,7 @@
             <a:pPr lvl="0"/>
             <a:r>
               <a:rPr lang="en-US"/>
-              <a:t>Edit Master text styles</a:t>
+              <a:t>Click to edit Master text styles</a:t>
             </a:r>
           </a:p>
           <a:p>
@@ -915,7 +908,7 @@
     </p:spTree>
     <p:extLst>
       <p:ext uri="{BB962C8B-B14F-4D97-AF65-F5344CB8AC3E}">
-        <p14:creationId xmlns:p14="http://schemas.microsoft.com/office/powerpoint/2010/main" val="4017234516"/>
+        <p14:creationId xmlns:p14="http://schemas.microsoft.com/office/powerpoint/2010/main" val="1432714602"/>
       </p:ext>
     </p:extLst>
   </p:cSld>
@@ -925,13 +918,13 @@
 </p:sldLayout>
 </file>
 
-<file path=ppt/slideMasters/slideMaster1.xml><?xml version="1.0" encoding="utf-8"?>
-<p:sldMaster xmlns:a="http://schemas.openxmlformats.org/drawingml/2006/main" xmlns:r="http://schemas.openxmlformats.org/officeDocument/2006/relationships" xmlns:p="http://schemas.openxmlformats.org/presentationml/2006/main">
-  <p:cSld>
+<file path=ppt/slideLayouts/slideLayout5.xml><?xml version="1.0" encoding="utf-8"?>
+<p:sldLayout xmlns:a="http://schemas.openxmlformats.org/drawingml/2006/main" xmlns:r="http://schemas.openxmlformats.org/officeDocument/2006/relationships" xmlns:p="http://schemas.openxmlformats.org/presentationml/2006/main" type="obj" preserve="1">
+  <p:cSld name="4_Title and Content">
     <p:bg>
       <p:bgPr>
         <a:blipFill dpi="0" rotWithShape="1">
-          <a:blip r:embed="rId6">
+          <a:blip r:embed="rId2">
             <a:lum/>
           </a:blip>
           <a:srcRect/>
@@ -958,6 +951,600 @@
       </p:grpSpPr>
       <p:sp>
         <p:nvSpPr>
+          <p:cNvPr id="2" name="Title 1">
+            <a:extLst>
+              <a:ext uri="{FF2B5EF4-FFF2-40B4-BE49-F238E27FC236}">
+                <a16:creationId xmlns:a16="http://schemas.microsoft.com/office/drawing/2014/main" id="{0ECBFABF-0FF7-46A7-A3E7-B6C1EFC20E36}"/>
+              </a:ext>
+            </a:extLst>
+          </p:cNvPr>
+          <p:cNvSpPr>
+            <a:spLocks noGrp="1"/>
+          </p:cNvSpPr>
+          <p:nvPr>
+            <p:ph type="title"/>
+          </p:nvPr>
+        </p:nvSpPr>
+        <p:spPr/>
+        <p:txBody>
+          <a:bodyPr/>
+          <a:lstStyle>
+            <a:lvl1pPr>
+              <a:defRPr>
+                <a:solidFill>
+                  <a:srgbClr val="171717"/>
+                </a:solidFill>
+              </a:defRPr>
+            </a:lvl1pPr>
+          </a:lstStyle>
+          <a:p>
+            <a:r>
+              <a:rPr lang="en-US"/>
+              <a:t>Click to edit Master title style</a:t>
+            </a:r>
+            <a:endParaRPr lang="en-CA"/>
+          </a:p>
+        </p:txBody>
+      </p:sp>
+      <p:sp>
+        <p:nvSpPr>
+          <p:cNvPr id="3" name="Content Placeholder 2">
+            <a:extLst>
+              <a:ext uri="{FF2B5EF4-FFF2-40B4-BE49-F238E27FC236}">
+                <a16:creationId xmlns:a16="http://schemas.microsoft.com/office/drawing/2014/main" id="{85D1B3E0-28C0-49B4-B789-CFB199546EE9}"/>
+              </a:ext>
+            </a:extLst>
+          </p:cNvPr>
+          <p:cNvSpPr>
+            <a:spLocks noGrp="1"/>
+          </p:cNvSpPr>
+          <p:nvPr>
+            <p:ph idx="1"/>
+          </p:nvPr>
+        </p:nvSpPr>
+        <p:spPr>
+          <a:xfrm>
+            <a:off x="838200" y="1825624"/>
+            <a:ext cx="10515600" cy="4835479"/>
+          </a:xfrm>
+          <a:prstGeom prst="rect">
+            <a:avLst/>
+          </a:prstGeom>
+        </p:spPr>
+        <p:txBody>
+          <a:bodyPr/>
+          <a:lstStyle>
+            <a:lvl1pPr>
+              <a:buClr>
+                <a:schemeClr val="accent2"/>
+              </a:buClr>
+              <a:defRPr>
+                <a:solidFill>
+                  <a:srgbClr val="171717"/>
+                </a:solidFill>
+              </a:defRPr>
+            </a:lvl1pPr>
+            <a:lvl2pPr>
+              <a:buClr>
+                <a:schemeClr val="accent2"/>
+              </a:buClr>
+              <a:defRPr>
+                <a:solidFill>
+                  <a:srgbClr val="171717"/>
+                </a:solidFill>
+              </a:defRPr>
+            </a:lvl2pPr>
+            <a:lvl3pPr>
+              <a:buClr>
+                <a:schemeClr val="accent2"/>
+              </a:buClr>
+              <a:defRPr>
+                <a:solidFill>
+                  <a:srgbClr val="171717"/>
+                </a:solidFill>
+              </a:defRPr>
+            </a:lvl3pPr>
+            <a:lvl4pPr>
+              <a:buClr>
+                <a:schemeClr val="accent2"/>
+              </a:buClr>
+              <a:defRPr>
+                <a:solidFill>
+                  <a:srgbClr val="171717"/>
+                </a:solidFill>
+              </a:defRPr>
+            </a:lvl4pPr>
+            <a:lvl5pPr>
+              <a:buClr>
+                <a:schemeClr val="accent2"/>
+              </a:buClr>
+              <a:defRPr>
+                <a:solidFill>
+                  <a:srgbClr val="171717"/>
+                </a:solidFill>
+              </a:defRPr>
+            </a:lvl5pPr>
+          </a:lstStyle>
+          <a:p>
+            <a:pPr lvl="0"/>
+            <a:r>
+              <a:rPr lang="en-US"/>
+              <a:t>Click to edit Master text styles</a:t>
+            </a:r>
+          </a:p>
+          <a:p>
+            <a:pPr lvl="1"/>
+            <a:r>
+              <a:rPr lang="en-US"/>
+              <a:t>Second level</a:t>
+            </a:r>
+          </a:p>
+          <a:p>
+            <a:pPr lvl="2"/>
+            <a:r>
+              <a:rPr lang="en-US"/>
+              <a:t>Third level</a:t>
+            </a:r>
+          </a:p>
+          <a:p>
+            <a:pPr lvl="3"/>
+            <a:r>
+              <a:rPr lang="en-US"/>
+              <a:t>Fourth level</a:t>
+            </a:r>
+          </a:p>
+          <a:p>
+            <a:pPr lvl="4"/>
+            <a:r>
+              <a:rPr lang="en-US"/>
+              <a:t>Fifth level</a:t>
+            </a:r>
+            <a:endParaRPr lang="en-CA" dirty="0"/>
+          </a:p>
+        </p:txBody>
+      </p:sp>
+    </p:spTree>
+    <p:extLst>
+      <p:ext uri="{BB962C8B-B14F-4D97-AF65-F5344CB8AC3E}">
+        <p14:creationId xmlns:p14="http://schemas.microsoft.com/office/powerpoint/2010/main" val="3116332322"/>
+      </p:ext>
+    </p:extLst>
+  </p:cSld>
+  <p:clrMapOvr>
+    <a:masterClrMapping/>
+  </p:clrMapOvr>
+</p:sldLayout>
+</file>
+
+<file path=ppt/slideLayouts/slideLayout6.xml><?xml version="1.0" encoding="utf-8"?>
+<p:sldLayout xmlns:a="http://schemas.openxmlformats.org/drawingml/2006/main" xmlns:r="http://schemas.openxmlformats.org/officeDocument/2006/relationships" xmlns:p="http://schemas.openxmlformats.org/presentationml/2006/main" type="obj" preserve="1">
+  <p:cSld name="5_Title and Content">
+    <p:bg>
+      <p:bgPr>
+        <a:blipFill dpi="0" rotWithShape="1">
+          <a:blip r:embed="rId2">
+            <a:lum/>
+          </a:blip>
+          <a:srcRect/>
+          <a:stretch>
+            <a:fillRect/>
+          </a:stretch>
+        </a:blipFill>
+        <a:effectLst/>
+      </p:bgPr>
+    </p:bg>
+    <p:spTree>
+      <p:nvGrpSpPr>
+        <p:cNvPr id="1" name=""/>
+        <p:cNvGrpSpPr/>
+        <p:nvPr/>
+      </p:nvGrpSpPr>
+      <p:grpSpPr>
+        <a:xfrm>
+          <a:off x="0" y="0"/>
+          <a:ext cx="0" cy="0"/>
+          <a:chOff x="0" y="0"/>
+          <a:chExt cx="0" cy="0"/>
+        </a:xfrm>
+      </p:grpSpPr>
+      <p:sp>
+        <p:nvSpPr>
+          <p:cNvPr id="2" name="Title 1">
+            <a:extLst>
+              <a:ext uri="{FF2B5EF4-FFF2-40B4-BE49-F238E27FC236}">
+                <a16:creationId xmlns:a16="http://schemas.microsoft.com/office/drawing/2014/main" id="{0ECBFABF-0FF7-46A7-A3E7-B6C1EFC20E36}"/>
+              </a:ext>
+            </a:extLst>
+          </p:cNvPr>
+          <p:cNvSpPr>
+            <a:spLocks noGrp="1"/>
+          </p:cNvSpPr>
+          <p:nvPr>
+            <p:ph type="title"/>
+          </p:nvPr>
+        </p:nvSpPr>
+        <p:spPr/>
+        <p:txBody>
+          <a:bodyPr/>
+          <a:lstStyle>
+            <a:lvl1pPr>
+              <a:defRPr>
+                <a:solidFill>
+                  <a:schemeClr val="tx1"/>
+                </a:solidFill>
+              </a:defRPr>
+            </a:lvl1pPr>
+          </a:lstStyle>
+          <a:p>
+            <a:r>
+              <a:rPr lang="en-US"/>
+              <a:t>Click to edit Master title style</a:t>
+            </a:r>
+            <a:endParaRPr lang="en-CA"/>
+          </a:p>
+        </p:txBody>
+      </p:sp>
+      <p:sp>
+        <p:nvSpPr>
+          <p:cNvPr id="3" name="Content Placeholder 2">
+            <a:extLst>
+              <a:ext uri="{FF2B5EF4-FFF2-40B4-BE49-F238E27FC236}">
+                <a16:creationId xmlns:a16="http://schemas.microsoft.com/office/drawing/2014/main" id="{85D1B3E0-28C0-49B4-B789-CFB199546EE9}"/>
+              </a:ext>
+            </a:extLst>
+          </p:cNvPr>
+          <p:cNvSpPr>
+            <a:spLocks noGrp="1"/>
+          </p:cNvSpPr>
+          <p:nvPr>
+            <p:ph idx="1"/>
+          </p:nvPr>
+        </p:nvSpPr>
+        <p:spPr>
+          <a:xfrm>
+            <a:off x="838200" y="1825624"/>
+            <a:ext cx="10515600" cy="4835479"/>
+          </a:xfrm>
+          <a:prstGeom prst="rect">
+            <a:avLst/>
+          </a:prstGeom>
+        </p:spPr>
+        <p:txBody>
+          <a:bodyPr/>
+          <a:lstStyle>
+            <a:lvl1pPr>
+              <a:buClr>
+                <a:schemeClr val="accent2"/>
+              </a:buClr>
+              <a:defRPr>
+                <a:solidFill>
+                  <a:schemeClr val="tx1"/>
+                </a:solidFill>
+              </a:defRPr>
+            </a:lvl1pPr>
+            <a:lvl2pPr>
+              <a:buClr>
+                <a:schemeClr val="accent2"/>
+              </a:buClr>
+              <a:defRPr>
+                <a:solidFill>
+                  <a:schemeClr val="tx1"/>
+                </a:solidFill>
+              </a:defRPr>
+            </a:lvl2pPr>
+            <a:lvl3pPr>
+              <a:buClr>
+                <a:schemeClr val="accent2"/>
+              </a:buClr>
+              <a:defRPr>
+                <a:solidFill>
+                  <a:schemeClr val="tx1"/>
+                </a:solidFill>
+              </a:defRPr>
+            </a:lvl3pPr>
+            <a:lvl4pPr>
+              <a:buClr>
+                <a:schemeClr val="accent2"/>
+              </a:buClr>
+              <a:defRPr>
+                <a:solidFill>
+                  <a:schemeClr val="tx1"/>
+                </a:solidFill>
+              </a:defRPr>
+            </a:lvl4pPr>
+            <a:lvl5pPr>
+              <a:buClr>
+                <a:schemeClr val="accent2"/>
+              </a:buClr>
+              <a:defRPr>
+                <a:solidFill>
+                  <a:schemeClr val="tx1"/>
+                </a:solidFill>
+              </a:defRPr>
+            </a:lvl5pPr>
+          </a:lstStyle>
+          <a:p>
+            <a:pPr lvl="0"/>
+            <a:r>
+              <a:rPr lang="en-US"/>
+              <a:t>Click to edit Master text styles</a:t>
+            </a:r>
+          </a:p>
+          <a:p>
+            <a:pPr lvl="1"/>
+            <a:r>
+              <a:rPr lang="en-US"/>
+              <a:t>Second level</a:t>
+            </a:r>
+          </a:p>
+          <a:p>
+            <a:pPr lvl="2"/>
+            <a:r>
+              <a:rPr lang="en-US"/>
+              <a:t>Third level</a:t>
+            </a:r>
+          </a:p>
+          <a:p>
+            <a:pPr lvl="3"/>
+            <a:r>
+              <a:rPr lang="en-US"/>
+              <a:t>Fourth level</a:t>
+            </a:r>
+          </a:p>
+          <a:p>
+            <a:pPr lvl="4"/>
+            <a:r>
+              <a:rPr lang="en-US"/>
+              <a:t>Fifth level</a:t>
+            </a:r>
+            <a:endParaRPr lang="en-CA" dirty="0"/>
+          </a:p>
+        </p:txBody>
+      </p:sp>
+    </p:spTree>
+    <p:extLst>
+      <p:ext uri="{BB962C8B-B14F-4D97-AF65-F5344CB8AC3E}">
+        <p14:creationId xmlns:p14="http://schemas.microsoft.com/office/powerpoint/2010/main" val="3306553474"/>
+      </p:ext>
+    </p:extLst>
+  </p:cSld>
+  <p:clrMapOvr>
+    <a:masterClrMapping/>
+  </p:clrMapOvr>
+</p:sldLayout>
+</file>
+
+<file path=ppt/slideLayouts/slideLayout7.xml><?xml version="1.0" encoding="utf-8"?>
+<p:sldLayout xmlns:a="http://schemas.openxmlformats.org/drawingml/2006/main" xmlns:r="http://schemas.openxmlformats.org/officeDocument/2006/relationships" xmlns:p="http://schemas.openxmlformats.org/presentationml/2006/main" type="obj" preserve="1">
+  <p:cSld name="6_Title and Content">
+    <p:bg>
+      <p:bgPr>
+        <a:blipFill dpi="0" rotWithShape="1">
+          <a:blip r:embed="rId2">
+            <a:lum/>
+          </a:blip>
+          <a:srcRect/>
+          <a:stretch>
+            <a:fillRect/>
+          </a:stretch>
+        </a:blipFill>
+        <a:effectLst/>
+      </p:bgPr>
+    </p:bg>
+    <p:spTree>
+      <p:nvGrpSpPr>
+        <p:cNvPr id="1" name=""/>
+        <p:cNvGrpSpPr/>
+        <p:nvPr/>
+      </p:nvGrpSpPr>
+      <p:grpSpPr>
+        <a:xfrm>
+          <a:off x="0" y="0"/>
+          <a:ext cx="0" cy="0"/>
+          <a:chOff x="0" y="0"/>
+          <a:chExt cx="0" cy="0"/>
+        </a:xfrm>
+      </p:grpSpPr>
+      <p:sp>
+        <p:nvSpPr>
+          <p:cNvPr id="2" name="Title 1">
+            <a:extLst>
+              <a:ext uri="{FF2B5EF4-FFF2-40B4-BE49-F238E27FC236}">
+                <a16:creationId xmlns:a16="http://schemas.microsoft.com/office/drawing/2014/main" id="{0ECBFABF-0FF7-46A7-A3E7-B6C1EFC20E36}"/>
+              </a:ext>
+            </a:extLst>
+          </p:cNvPr>
+          <p:cNvSpPr>
+            <a:spLocks noGrp="1"/>
+          </p:cNvSpPr>
+          <p:nvPr>
+            <p:ph type="title"/>
+          </p:nvPr>
+        </p:nvSpPr>
+        <p:spPr/>
+        <p:txBody>
+          <a:bodyPr/>
+          <a:lstStyle>
+            <a:lvl1pPr>
+              <a:defRPr>
+                <a:solidFill>
+                  <a:srgbClr val="FFFFFF"/>
+                </a:solidFill>
+              </a:defRPr>
+            </a:lvl1pPr>
+          </a:lstStyle>
+          <a:p>
+            <a:r>
+              <a:rPr lang="en-US"/>
+              <a:t>Click to edit Master title style</a:t>
+            </a:r>
+            <a:endParaRPr lang="en-CA"/>
+          </a:p>
+        </p:txBody>
+      </p:sp>
+      <p:sp>
+        <p:nvSpPr>
+          <p:cNvPr id="3" name="Content Placeholder 2">
+            <a:extLst>
+              <a:ext uri="{FF2B5EF4-FFF2-40B4-BE49-F238E27FC236}">
+                <a16:creationId xmlns:a16="http://schemas.microsoft.com/office/drawing/2014/main" id="{85D1B3E0-28C0-49B4-B789-CFB199546EE9}"/>
+              </a:ext>
+            </a:extLst>
+          </p:cNvPr>
+          <p:cNvSpPr>
+            <a:spLocks noGrp="1"/>
+          </p:cNvSpPr>
+          <p:nvPr>
+            <p:ph idx="1"/>
+          </p:nvPr>
+        </p:nvSpPr>
+        <p:spPr>
+          <a:xfrm>
+            <a:off x="838200" y="1825624"/>
+            <a:ext cx="10515600" cy="4835479"/>
+          </a:xfrm>
+          <a:prstGeom prst="rect">
+            <a:avLst/>
+          </a:prstGeom>
+        </p:spPr>
+        <p:txBody>
+          <a:bodyPr/>
+          <a:lstStyle>
+            <a:lvl1pPr>
+              <a:buClr>
+                <a:schemeClr val="accent2"/>
+              </a:buClr>
+              <a:defRPr>
+                <a:solidFill>
+                  <a:srgbClr val="FFFFFF"/>
+                </a:solidFill>
+              </a:defRPr>
+            </a:lvl1pPr>
+            <a:lvl2pPr>
+              <a:buClr>
+                <a:schemeClr val="accent2"/>
+              </a:buClr>
+              <a:defRPr>
+                <a:solidFill>
+                  <a:srgbClr val="FFFFFF"/>
+                </a:solidFill>
+              </a:defRPr>
+            </a:lvl2pPr>
+            <a:lvl3pPr>
+              <a:buClr>
+                <a:schemeClr val="accent2"/>
+              </a:buClr>
+              <a:defRPr>
+                <a:solidFill>
+                  <a:srgbClr val="FFFFFF"/>
+                </a:solidFill>
+              </a:defRPr>
+            </a:lvl3pPr>
+            <a:lvl4pPr>
+              <a:buClr>
+                <a:schemeClr val="accent2"/>
+              </a:buClr>
+              <a:defRPr>
+                <a:solidFill>
+                  <a:srgbClr val="FFFFFF"/>
+                </a:solidFill>
+              </a:defRPr>
+            </a:lvl4pPr>
+            <a:lvl5pPr>
+              <a:buClr>
+                <a:schemeClr val="accent2"/>
+              </a:buClr>
+              <a:defRPr>
+                <a:solidFill>
+                  <a:srgbClr val="FFFFFF"/>
+                </a:solidFill>
+              </a:defRPr>
+            </a:lvl5pPr>
+          </a:lstStyle>
+          <a:p>
+            <a:pPr lvl="0"/>
+            <a:r>
+              <a:rPr lang="en-US"/>
+              <a:t>Click to edit Master text styles</a:t>
+            </a:r>
+          </a:p>
+          <a:p>
+            <a:pPr lvl="1"/>
+            <a:r>
+              <a:rPr lang="en-US"/>
+              <a:t>Second level</a:t>
+            </a:r>
+          </a:p>
+          <a:p>
+            <a:pPr lvl="2"/>
+            <a:r>
+              <a:rPr lang="en-US"/>
+              <a:t>Third level</a:t>
+            </a:r>
+          </a:p>
+          <a:p>
+            <a:pPr lvl="3"/>
+            <a:r>
+              <a:rPr lang="en-US"/>
+              <a:t>Fourth level</a:t>
+            </a:r>
+          </a:p>
+          <a:p>
+            <a:pPr lvl="4"/>
+            <a:r>
+              <a:rPr lang="en-US"/>
+              <a:t>Fifth level</a:t>
+            </a:r>
+            <a:endParaRPr lang="en-CA" dirty="0"/>
+          </a:p>
+        </p:txBody>
+      </p:sp>
+    </p:spTree>
+    <p:extLst>
+      <p:ext uri="{BB962C8B-B14F-4D97-AF65-F5344CB8AC3E}">
+        <p14:creationId xmlns:p14="http://schemas.microsoft.com/office/powerpoint/2010/main" val="3491887914"/>
+      </p:ext>
+    </p:extLst>
+  </p:cSld>
+  <p:clrMapOvr>
+    <a:masterClrMapping/>
+  </p:clrMapOvr>
+</p:sldLayout>
+</file>
+
+<file path=ppt/slideMasters/slideMaster1.xml><?xml version="1.0" encoding="utf-8"?>
+<p:sldMaster xmlns:a="http://schemas.openxmlformats.org/drawingml/2006/main" xmlns:r="http://schemas.openxmlformats.org/officeDocument/2006/relationships" xmlns:p="http://schemas.openxmlformats.org/presentationml/2006/main">
+  <p:cSld>
+    <p:bg>
+      <p:bgPr>
+        <a:blipFill dpi="0" rotWithShape="1">
+          <a:blip r:embed="rId9">
+            <a:lum/>
+          </a:blip>
+          <a:srcRect/>
+          <a:stretch>
+            <a:fillRect/>
+          </a:stretch>
+        </a:blipFill>
+        <a:effectLst/>
+      </p:bgPr>
+    </p:bg>
+    <p:spTree>
+      <p:nvGrpSpPr>
+        <p:cNvPr id="1" name=""/>
+        <p:cNvGrpSpPr/>
+        <p:nvPr/>
+      </p:nvGrpSpPr>
+      <p:grpSpPr>
+        <a:xfrm>
+          <a:off x="0" y="0"/>
+          <a:ext cx="0" cy="0"/>
+          <a:chOff x="0" y="0"/>
+          <a:chExt cx="0" cy="0"/>
+        </a:xfrm>
+      </p:grpSpPr>
+      <p:sp>
+        <p:nvSpPr>
           <p:cNvPr id="2" name="Title Placeholder 1">
             <a:extLst>
               <a:ext uri="{FF2B5EF4-FFF2-40B4-BE49-F238E27FC236}">
@@ -1029,7 +1616,7 @@
             <a:pPr lvl="0"/>
             <a:r>
               <a:rPr lang="en-US"/>
-              <a:t>Edit Master text styles</a:t>
+              <a:t>Click to edit Master text styles</a:t>
             </a:r>
           </a:p>
           <a:p>
@@ -1066,16 +1653,19 @@
     </p:spTree>
     <p:extLst>
       <p:ext uri="{BB962C8B-B14F-4D97-AF65-F5344CB8AC3E}">
-        <p14:creationId xmlns:p14="http://schemas.microsoft.com/office/powerpoint/2010/main" val="2325685743"/>
+        <p14:creationId xmlns:p14="http://schemas.microsoft.com/office/powerpoint/2010/main" val="3492742058"/>
       </p:ext>
     </p:extLst>
   </p:cSld>
   <p:clrMap bg1="lt1" tx1="dk1" bg2="lt2" tx2="dk2" accent1="accent1" accent2="accent2" accent3="accent3" accent4="accent4" accent5="accent5" accent6="accent6" hlink="hlink" folHlink="folHlink"/>
   <p:sldLayoutIdLst>
-    <p:sldLayoutId id="2147483666" r:id="rId1"/>
-    <p:sldLayoutId id="2147483667" r:id="rId2"/>
-    <p:sldLayoutId id="2147483668" r:id="rId3"/>
-    <p:sldLayoutId id="2147483669" r:id="rId4"/>
+    <p:sldLayoutId id="2147483671" r:id="rId1"/>
+    <p:sldLayoutId id="2147483672" r:id="rId2"/>
+    <p:sldLayoutId id="2147483673" r:id="rId3"/>
+    <p:sldLayoutId id="2147483674" r:id="rId4"/>
+    <p:sldLayoutId id="2147483675" r:id="rId5"/>
+    <p:sldLayoutId id="2147483676" r:id="rId6"/>
+    <p:sldLayoutId id="2147483677" r:id="rId7"/>
   </p:sldLayoutIdLst>
   <p:txStyles>
     <p:titleStyle>
@@ -1411,7 +2001,7 @@
         <p:spPr/>
         <p:txBody>
           <a:bodyPr>
-            <a:normAutofit fontScale="90000"/>
+            <a:normAutofit/>
           </a:bodyPr>
           <a:lstStyle/>
           <a:p>
@@ -1485,7 +2075,7 @@
                   <a:schemeClr val="accent6"/>
                 </a:solidFill>
               </a:rPr>
-              <a:t>10</a:t>
+              <a:t>9</a:t>
             </a:r>
             <a:r>
               <a:rPr lang="en-US" b="1" dirty="0"/>
@@ -1509,7 +2099,7 @@
                   <a:schemeClr val="accent6"/>
                 </a:solidFill>
               </a:rPr>
-              <a:t>2 </a:t>
+              <a:t>3 </a:t>
             </a:r>
             <a:r>
               <a:rPr lang="en-US" dirty="0">
@@ -1525,7 +2115,7 @@
                   <a:schemeClr val="accent6"/>
                 </a:solidFill>
               </a:rPr>
-              <a:t>10</a:t>
+              <a:t>9</a:t>
             </a:r>
             <a:r>
               <a:rPr lang="en-US" dirty="0"/>
@@ -1537,7 +2127,7 @@
                   <a:schemeClr val="accent6"/>
                 </a:solidFill>
               </a:rPr>
-              <a:t>2</a:t>
+              <a:t>3</a:t>
             </a:r>
             <a:r>
               <a:rPr lang="en-US" dirty="0">
@@ -2847,6 +3437,92 @@
       </p:sp>
       <p:sp>
         <p:nvSpPr>
+          <p:cNvPr id="5" name="Content Placeholder 2">
+            <a:extLst>
+              <a:ext uri="{FF2B5EF4-FFF2-40B4-BE49-F238E27FC236}">
+                <a16:creationId xmlns:a16="http://schemas.microsoft.com/office/drawing/2014/main" id="{F4E1B242-74FE-4433-A023-0912F16D8EEB}"/>
+              </a:ext>
+            </a:extLst>
+          </p:cNvPr>
+          <p:cNvSpPr>
+            <a:spLocks noGrp="1"/>
+          </p:cNvSpPr>
+          <p:nvPr>
+            <p:ph idx="1"/>
+          </p:nvPr>
+        </p:nvSpPr>
+        <p:spPr>
+          <a:xfrm>
+            <a:off x="838200" y="1825624"/>
+            <a:ext cx="4819281" cy="4835479"/>
+          </a:xfrm>
+        </p:spPr>
+        <p:txBody>
+          <a:bodyPr>
+            <a:normAutofit/>
+          </a:bodyPr>
+          <a:lstStyle/>
+          <a:p>
+            <a:r>
+              <a:rPr lang="en-US" dirty="0"/>
+              <a:t>Because at the time of designing the class we don</a:t>
+            </a:r>
+            <a:r>
+              <a:rPr lang="en-US" dirty="0">
+                <a:solidFill>
+                  <a:schemeClr val="accent2"/>
+                </a:solidFill>
+              </a:rPr>
+              <a:t>’</a:t>
+            </a:r>
+            <a:r>
+              <a:rPr lang="en-US" dirty="0"/>
+              <a:t>t know what these instance names will be</a:t>
+            </a:r>
+            <a:r>
+              <a:rPr lang="en-US" dirty="0">
+                <a:solidFill>
+                  <a:schemeClr val="accent2"/>
+                </a:solidFill>
+              </a:rPr>
+              <a:t>,</a:t>
+            </a:r>
+            <a:r>
+              <a:rPr lang="en-US" dirty="0"/>
+              <a:t> we just chose one</a:t>
+            </a:r>
+            <a:r>
+              <a:rPr lang="en-US" dirty="0">
+                <a:solidFill>
+                  <a:schemeClr val="accent2"/>
+                </a:solidFill>
+              </a:rPr>
+              <a:t>. </a:t>
+            </a:r>
+          </a:p>
+          <a:p>
+            <a:pPr lvl="1"/>
+            <a:r>
+              <a:rPr lang="en-US" b="1" dirty="0">
+                <a:solidFill>
+                  <a:srgbClr val="E00BE5"/>
+                </a:solidFill>
+              </a:rPr>
+              <a:t>self</a:t>
+            </a:r>
+          </a:p>
+          <a:p>
+            <a:pPr lvl="1"/>
+            <a:endParaRPr lang="en-US" b="1" dirty="0">
+              <a:solidFill>
+                <a:schemeClr val="accent2"/>
+              </a:solidFill>
+            </a:endParaRPr>
+          </a:p>
+        </p:txBody>
+      </p:sp>
+      <p:sp>
+        <p:nvSpPr>
           <p:cNvPr id="12" name="TextBox 11">
             <a:extLst>
               <a:ext uri="{FF2B5EF4-FFF2-40B4-BE49-F238E27FC236}">
@@ -3102,92 +3778,6 @@
               </a:rPr>
               <a:t>return self.x, self.y</a:t>
             </a:r>
-          </a:p>
-        </p:txBody>
-      </p:sp>
-      <p:sp>
-        <p:nvSpPr>
-          <p:cNvPr id="5" name="Content Placeholder 2">
-            <a:extLst>
-              <a:ext uri="{FF2B5EF4-FFF2-40B4-BE49-F238E27FC236}">
-                <a16:creationId xmlns:a16="http://schemas.microsoft.com/office/drawing/2014/main" id="{F4E1B242-74FE-4433-A023-0912F16D8EEB}"/>
-              </a:ext>
-            </a:extLst>
-          </p:cNvPr>
-          <p:cNvSpPr>
-            <a:spLocks noGrp="1"/>
-          </p:cNvSpPr>
-          <p:nvPr>
-            <p:ph idx="1"/>
-          </p:nvPr>
-        </p:nvSpPr>
-        <p:spPr>
-          <a:xfrm>
-            <a:off x="838200" y="1825624"/>
-            <a:ext cx="4819281" cy="4835479"/>
-          </a:xfrm>
-        </p:spPr>
-        <p:txBody>
-          <a:bodyPr>
-            <a:normAutofit/>
-          </a:bodyPr>
-          <a:lstStyle/>
-          <a:p>
-            <a:r>
-              <a:rPr lang="en-US" dirty="0"/>
-              <a:t>Because at the time of designing the class we don</a:t>
-            </a:r>
-            <a:r>
-              <a:rPr lang="en-US" dirty="0">
-                <a:solidFill>
-                  <a:schemeClr val="accent2"/>
-                </a:solidFill>
-              </a:rPr>
-              <a:t>’</a:t>
-            </a:r>
-            <a:r>
-              <a:rPr lang="en-US" dirty="0"/>
-              <a:t>t know what these instance names will be</a:t>
-            </a:r>
-            <a:r>
-              <a:rPr lang="en-US" dirty="0">
-                <a:solidFill>
-                  <a:schemeClr val="accent2"/>
-                </a:solidFill>
-              </a:rPr>
-              <a:t>,</a:t>
-            </a:r>
-            <a:r>
-              <a:rPr lang="en-US" dirty="0"/>
-              <a:t> we just chose one</a:t>
-            </a:r>
-            <a:r>
-              <a:rPr lang="en-US" dirty="0">
-                <a:solidFill>
-                  <a:schemeClr val="accent2"/>
-                </a:solidFill>
-              </a:rPr>
-              <a:t>. </a:t>
-            </a:r>
-          </a:p>
-          <a:p>
-            <a:pPr lvl="1"/>
-            <a:r>
-              <a:rPr lang="en-US" b="1" dirty="0">
-                <a:solidFill>
-                  <a:srgbClr val="E00BE5"/>
-                </a:solidFill>
-              </a:rPr>
-              <a:t>self</a:t>
-            </a:r>
-          </a:p>
-          <a:p>
-            <a:pPr lvl="1"/>
-            <a:endParaRPr lang="en-US" b="1" dirty="0">
-              <a:solidFill>
-                <a:schemeClr val="accent2"/>
-              </a:solidFill>
-            </a:endParaRPr>
           </a:p>
         </p:txBody>
       </p:sp>
@@ -3261,6 +3851,145 @@
       </p:sp>
       <p:sp>
         <p:nvSpPr>
+          <p:cNvPr id="5" name="Content Placeholder 2">
+            <a:extLst>
+              <a:ext uri="{FF2B5EF4-FFF2-40B4-BE49-F238E27FC236}">
+                <a16:creationId xmlns:a16="http://schemas.microsoft.com/office/drawing/2014/main" id="{F4E1B242-74FE-4433-A023-0912F16D8EEB}"/>
+              </a:ext>
+            </a:extLst>
+          </p:cNvPr>
+          <p:cNvSpPr>
+            <a:spLocks noGrp="1"/>
+          </p:cNvSpPr>
+          <p:nvPr>
+            <p:ph idx="1"/>
+          </p:nvPr>
+        </p:nvSpPr>
+        <p:spPr>
+          <a:xfrm>
+            <a:off x="838200" y="1825624"/>
+            <a:ext cx="4819281" cy="4835479"/>
+          </a:xfrm>
+        </p:spPr>
+        <p:txBody>
+          <a:bodyPr>
+            <a:normAutofit/>
+          </a:bodyPr>
+          <a:lstStyle/>
+          <a:p>
+            <a:r>
+              <a:rPr lang="en-US" dirty="0"/>
+              <a:t>Although you do not technically need to use the word </a:t>
+            </a:r>
+            <a:r>
+              <a:rPr lang="en-US" dirty="0">
+                <a:solidFill>
+                  <a:schemeClr val="accent6"/>
+                </a:solidFill>
+              </a:rPr>
+              <a:t>self</a:t>
+            </a:r>
+            <a:r>
+              <a:rPr lang="en-US" dirty="0">
+                <a:solidFill>
+                  <a:schemeClr val="accent2"/>
+                </a:solidFill>
+              </a:rPr>
+              <a:t>,</a:t>
+            </a:r>
+            <a:r>
+              <a:rPr lang="en-US" dirty="0"/>
+              <a:t> it is widely adopted and is recommended</a:t>
+            </a:r>
+            <a:r>
+              <a:rPr lang="en-US" dirty="0">
+                <a:solidFill>
+                  <a:schemeClr val="accent2"/>
+                </a:solidFill>
+              </a:rPr>
+              <a:t>.</a:t>
+            </a:r>
+          </a:p>
+          <a:p>
+            <a:pPr lvl="1"/>
+            <a:r>
+              <a:rPr lang="en-US" dirty="0">
+                <a:solidFill>
+                  <a:schemeClr val="accent2"/>
+                </a:solidFill>
+              </a:rPr>
+              <a:t>this </a:t>
+            </a:r>
+            <a:r>
+              <a:rPr lang="en-US" dirty="0">
+                <a:solidFill>
+                  <a:schemeClr val="accent6"/>
+                </a:solidFill>
+              </a:rPr>
+              <a:t>(</a:t>
+            </a:r>
+            <a:r>
+              <a:rPr lang="en-US" dirty="0"/>
+              <a:t>JavaScript</a:t>
+            </a:r>
+            <a:r>
+              <a:rPr lang="en-US" dirty="0">
+                <a:solidFill>
+                  <a:schemeClr val="accent6"/>
+                </a:solidFill>
+              </a:rPr>
+              <a:t>, </a:t>
+            </a:r>
+            <a:r>
+              <a:rPr lang="en-US" dirty="0"/>
+              <a:t>Java</a:t>
+            </a:r>
+            <a:r>
+              <a:rPr lang="en-US" dirty="0">
+                <a:solidFill>
+                  <a:schemeClr val="accent6"/>
+                </a:solidFill>
+              </a:rPr>
+              <a:t>)</a:t>
+            </a:r>
+          </a:p>
+          <a:p>
+            <a:pPr lvl="1"/>
+            <a:r>
+              <a:rPr lang="en-US" dirty="0">
+                <a:solidFill>
+                  <a:schemeClr val="accent2"/>
+                </a:solidFill>
+              </a:rPr>
+              <a:t>instance</a:t>
+            </a:r>
+          </a:p>
+          <a:p>
+            <a:pPr lvl="1"/>
+            <a:r>
+              <a:rPr lang="en-US" dirty="0">
+                <a:solidFill>
+                  <a:schemeClr val="accent2"/>
+                </a:solidFill>
+              </a:rPr>
+              <a:t>thing</a:t>
+            </a:r>
+          </a:p>
+          <a:p>
+            <a:pPr lvl="1"/>
+            <a:r>
+              <a:rPr lang="en-US" b="1" dirty="0">
+                <a:solidFill>
+                  <a:srgbClr val="E00BE5"/>
+                </a:solidFill>
+              </a:rPr>
+              <a:t>self</a:t>
+            </a:r>
+          </a:p>
+        </p:txBody>
+      </p:sp>
+      <p:sp>
+        <p:nvSpPr>
           <p:cNvPr id="12" name="TextBox 11">
             <a:extLst>
               <a:ext uri="{FF2B5EF4-FFF2-40B4-BE49-F238E27FC236}">
@@ -3515,145 +4244,6 @@
                 <a:cs typeface="Courier New" panose="02070309020205020404" pitchFamily="49" charset="0"/>
               </a:rPr>
               <a:t>return self.x, self.y</a:t>
-            </a:r>
-          </a:p>
-        </p:txBody>
-      </p:sp>
-      <p:sp>
-        <p:nvSpPr>
-          <p:cNvPr id="5" name="Content Placeholder 2">
-            <a:extLst>
-              <a:ext uri="{FF2B5EF4-FFF2-40B4-BE49-F238E27FC236}">
-                <a16:creationId xmlns:a16="http://schemas.microsoft.com/office/drawing/2014/main" id="{F4E1B242-74FE-4433-A023-0912F16D8EEB}"/>
-              </a:ext>
-            </a:extLst>
-          </p:cNvPr>
-          <p:cNvSpPr>
-            <a:spLocks noGrp="1"/>
-          </p:cNvSpPr>
-          <p:nvPr>
-            <p:ph idx="1"/>
-          </p:nvPr>
-        </p:nvSpPr>
-        <p:spPr>
-          <a:xfrm>
-            <a:off x="838200" y="1825624"/>
-            <a:ext cx="4819281" cy="4835479"/>
-          </a:xfrm>
-        </p:spPr>
-        <p:txBody>
-          <a:bodyPr>
-            <a:normAutofit/>
-          </a:bodyPr>
-          <a:lstStyle/>
-          <a:p>
-            <a:r>
-              <a:rPr lang="en-US" dirty="0"/>
-              <a:t>Although you do not technically need to use the word </a:t>
-            </a:r>
-            <a:r>
-              <a:rPr lang="en-US" dirty="0">
-                <a:solidFill>
-                  <a:schemeClr val="accent6"/>
-                </a:solidFill>
-              </a:rPr>
-              <a:t>self</a:t>
-            </a:r>
-            <a:r>
-              <a:rPr lang="en-US" dirty="0">
-                <a:solidFill>
-                  <a:schemeClr val="accent2"/>
-                </a:solidFill>
-              </a:rPr>
-              <a:t>,</a:t>
-            </a:r>
-            <a:r>
-              <a:rPr lang="en-US" dirty="0"/>
-              <a:t> it is widely adopted and is recommended</a:t>
-            </a:r>
-            <a:r>
-              <a:rPr lang="en-US" dirty="0">
-                <a:solidFill>
-                  <a:schemeClr val="accent2"/>
-                </a:solidFill>
-              </a:rPr>
-              <a:t>.</a:t>
-            </a:r>
-          </a:p>
-          <a:p>
-            <a:pPr lvl="1"/>
-            <a:r>
-              <a:rPr lang="en-US" dirty="0">
-                <a:solidFill>
-                  <a:schemeClr val="accent2"/>
-                </a:solidFill>
-              </a:rPr>
-              <a:t>this </a:t>
-            </a:r>
-            <a:r>
-              <a:rPr lang="en-US" dirty="0">
-                <a:solidFill>
-                  <a:schemeClr val="accent6"/>
-                </a:solidFill>
-              </a:rPr>
-              <a:t>(</a:t>
-            </a:r>
-            <a:r>
-              <a:rPr lang="en-US" dirty="0"/>
-              <a:t>JavaScript</a:t>
-            </a:r>
-            <a:r>
-              <a:rPr lang="en-US" dirty="0">
-                <a:solidFill>
-                  <a:schemeClr val="accent6"/>
-                </a:solidFill>
-              </a:rPr>
-              <a:t>, </a:t>
-            </a:r>
-            <a:r>
-              <a:rPr lang="en-US" dirty="0"/>
-              <a:t>Java</a:t>
-            </a:r>
-            <a:r>
-              <a:rPr lang="en-US" dirty="0">
-                <a:solidFill>
-                  <a:schemeClr val="accent6"/>
-                </a:solidFill>
-              </a:rPr>
-              <a:t>)</a:t>
-            </a:r>
-          </a:p>
-          <a:p>
-            <a:pPr lvl="1"/>
-            <a:r>
-              <a:rPr lang="en-US" dirty="0">
-                <a:solidFill>
-                  <a:schemeClr val="accent2"/>
-                </a:solidFill>
-              </a:rPr>
-              <a:t>instance</a:t>
-            </a:r>
-          </a:p>
-          <a:p>
-            <a:pPr lvl="1"/>
-            <a:r>
-              <a:rPr lang="en-US" dirty="0">
-                <a:solidFill>
-                  <a:schemeClr val="accent2"/>
-                </a:solidFill>
-              </a:rPr>
-              <a:t>thing</a:t>
-            </a:r>
-          </a:p>
-          <a:p>
-            <a:pPr lvl="1"/>
-            <a:r>
-              <a:rPr lang="en-US" b="1" dirty="0">
-                <a:solidFill>
-                  <a:srgbClr val="E00BE5"/>
-                </a:solidFill>
-              </a:rPr>
-              <a:t>self</a:t>
             </a:r>
           </a:p>
         </p:txBody>
@@ -5027,7 +5617,7 @@
             <a:avLst/>
           </a:prstGeom>
           <a:solidFill>
-            <a:schemeClr val="bg1"/>
+            <a:srgbClr val="2D2D2D"/>
           </a:solidFill>
           <a:ln>
             <a:noFill/>
@@ -11927,7 +12517,7 @@
             <a:r>
               <a:rPr lang="en-US" sz="3200" b="1" dirty="0">
                 <a:solidFill>
-                  <a:schemeClr val="bg1"/>
+                  <a:srgbClr val="2D2D2D"/>
                 </a:solidFill>
               </a:rPr>
               <a:t>TypeError: </a:t>
@@ -11937,7 +12527,7 @@
             <a:r>
               <a:rPr lang="en-US" sz="2400" dirty="0">
                 <a:solidFill>
-                  <a:schemeClr val="bg1"/>
+                  <a:srgbClr val="2D2D2D"/>
                 </a:solidFill>
               </a:rPr>
               <a:t>print_location() takes 0 positional arguments but 1 was given.</a:t>
@@ -16908,7 +17498,7 @@
         <p:spPr/>
         <p:txBody>
           <a:bodyPr>
-            <a:normAutofit fontScale="90000"/>
+            <a:normAutofit/>
           </a:bodyPr>
           <a:lstStyle/>
           <a:p>
@@ -16982,7 +17572,7 @@
                   <a:schemeClr val="accent6"/>
                 </a:solidFill>
               </a:rPr>
-              <a:t>10</a:t>
+              <a:t>9</a:t>
             </a:r>
             <a:r>
               <a:rPr lang="en-US" b="1" dirty="0"/>
@@ -17006,7 +17596,7 @@
                   <a:schemeClr val="accent6"/>
                 </a:solidFill>
               </a:rPr>
-              <a:t>2 </a:t>
+              <a:t>3 </a:t>
             </a:r>
             <a:r>
               <a:rPr lang="en-US" dirty="0">
@@ -17022,7 +17612,7 @@
                   <a:schemeClr val="accent6"/>
                 </a:solidFill>
               </a:rPr>
-              <a:t>10</a:t>
+              <a:t>9</a:t>
             </a:r>
             <a:r>
               <a:rPr lang="en-US" dirty="0"/>
@@ -17034,7 +17624,7 @@
                   <a:schemeClr val="accent6"/>
                 </a:solidFill>
               </a:rPr>
-              <a:t>2</a:t>
+              <a:t>3</a:t>
             </a:r>
             <a:r>
               <a:rPr lang="en-US" dirty="0">
@@ -18565,6 +19155,158 @@
       </p:sp>
       <p:sp>
         <p:nvSpPr>
+          <p:cNvPr id="8" name="Content Placeholder 2">
+            <a:extLst>
+              <a:ext uri="{FF2B5EF4-FFF2-40B4-BE49-F238E27FC236}">
+                <a16:creationId xmlns:a16="http://schemas.microsoft.com/office/drawing/2014/main" id="{9EF1E632-EB44-4712-B35B-CF93D4F2CB8A}"/>
+              </a:ext>
+            </a:extLst>
+          </p:cNvPr>
+          <p:cNvSpPr>
+            <a:spLocks noGrp="1"/>
+          </p:cNvSpPr>
+          <p:nvPr>
+            <p:ph idx="1"/>
+          </p:nvPr>
+        </p:nvSpPr>
+        <p:spPr>
+          <a:xfrm>
+            <a:off x="838200" y="1825624"/>
+            <a:ext cx="4853152" cy="4835479"/>
+          </a:xfrm>
+        </p:spPr>
+        <p:txBody>
+          <a:bodyPr>
+            <a:normAutofit/>
+          </a:bodyPr>
+          <a:lstStyle/>
+          <a:p>
+            <a:r>
+              <a:rPr lang="en-US" sz="3200" dirty="0"/>
+              <a:t>General form of a Class</a:t>
+            </a:r>
+            <a:r>
+              <a:rPr lang="en-US" sz="3200" dirty="0">
+                <a:solidFill>
+                  <a:schemeClr val="accent6"/>
+                </a:solidFill>
+              </a:rPr>
+              <a:t>:</a:t>
+            </a:r>
+            <a:endParaRPr lang="en-US" sz="2400" dirty="0">
+              <a:solidFill>
+                <a:schemeClr val="accent6"/>
+              </a:solidFill>
+            </a:endParaRPr>
+          </a:p>
+          <a:p>
+            <a:pPr lvl="1"/>
+            <a:r>
+              <a:rPr lang="en-US" sz="2800" dirty="0">
+                <a:solidFill>
+                  <a:srgbClr val="00FF00"/>
+                </a:solidFill>
+              </a:rPr>
+              <a:t>Class Name</a:t>
+            </a:r>
+          </a:p>
+          <a:p>
+            <a:pPr lvl="2"/>
+            <a:r>
+              <a:rPr lang="en-US" sz="2400" b="1" dirty="0">
+                <a:solidFill>
+                  <a:srgbClr val="00FF00"/>
+                </a:solidFill>
+              </a:rPr>
+              <a:t>CamelCase</a:t>
+            </a:r>
+          </a:p>
+          <a:p>
+            <a:pPr lvl="2"/>
+            <a:r>
+              <a:rPr lang="en-US" sz="2400" dirty="0">
+                <a:solidFill>
+                  <a:srgbClr val="00FF00"/>
+                </a:solidFill>
+              </a:rPr>
+              <a:t>CourseGrades</a:t>
+            </a:r>
+          </a:p>
+          <a:p>
+            <a:pPr lvl="2"/>
+            <a:r>
+              <a:rPr lang="en-US" sz="2400" dirty="0">
+                <a:solidFill>
+                  <a:srgbClr val="00FF00"/>
+                </a:solidFill>
+              </a:rPr>
+              <a:t>BankAccount</a:t>
+            </a:r>
+          </a:p>
+          <a:p>
+            <a:pPr lvl="2"/>
+            <a:r>
+              <a:rPr lang="en-US" sz="2400" dirty="0">
+                <a:solidFill>
+                  <a:srgbClr val="00FF00"/>
+                </a:solidFill>
+              </a:rPr>
+              <a:t>FlightStatus</a:t>
+            </a:r>
+          </a:p>
+          <a:p>
+            <a:pPr lvl="2"/>
+            <a:r>
+              <a:rPr lang="en-US" sz="2400" dirty="0">
+                <a:solidFill>
+                  <a:srgbClr val="00FF00"/>
+                </a:solidFill>
+              </a:rPr>
+              <a:t>XRayImage</a:t>
+            </a:r>
+          </a:p>
+          <a:p>
+            <a:pPr lvl="1"/>
+            <a:r>
+              <a:rPr lang="en-US" sz="2800" dirty="0">
+                <a:solidFill>
+                  <a:srgbClr val="FFD6AD"/>
+                </a:solidFill>
+              </a:rPr>
+              <a:t>Constructor</a:t>
+            </a:r>
+          </a:p>
+          <a:p>
+            <a:pPr lvl="1"/>
+            <a:r>
+              <a:rPr lang="en-US" sz="2800" dirty="0">
+                <a:solidFill>
+                  <a:srgbClr val="FF5050"/>
+                </a:solidFill>
+              </a:rPr>
+              <a:t>Methods</a:t>
+            </a:r>
+          </a:p>
+          <a:p>
+            <a:pPr lvl="1"/>
+            <a:endParaRPr lang="en-US" sz="2800" dirty="0">
+              <a:solidFill>
+                <a:schemeClr val="accent2"/>
+              </a:solidFill>
+            </a:endParaRPr>
+          </a:p>
+          <a:p>
+            <a:pPr lvl="1"/>
+            <a:endParaRPr lang="en-US" sz="2800" dirty="0">
+              <a:solidFill>
+                <a:schemeClr val="accent2"/>
+              </a:solidFill>
+            </a:endParaRPr>
+          </a:p>
+        </p:txBody>
+      </p:sp>
+      <p:sp>
+        <p:nvSpPr>
           <p:cNvPr id="6" name="TextBox 5">
             <a:extLst>
               <a:ext uri="{FF2B5EF4-FFF2-40B4-BE49-F238E27FC236}">
@@ -18782,158 +19524,6 @@
               </a:rPr>
               <a:t>      body</a:t>
             </a:r>
-          </a:p>
-        </p:txBody>
-      </p:sp>
-      <p:sp>
-        <p:nvSpPr>
-          <p:cNvPr id="8" name="Content Placeholder 2">
-            <a:extLst>
-              <a:ext uri="{FF2B5EF4-FFF2-40B4-BE49-F238E27FC236}">
-                <a16:creationId xmlns:a16="http://schemas.microsoft.com/office/drawing/2014/main" id="{9EF1E632-EB44-4712-B35B-CF93D4F2CB8A}"/>
-              </a:ext>
-            </a:extLst>
-          </p:cNvPr>
-          <p:cNvSpPr>
-            <a:spLocks noGrp="1"/>
-          </p:cNvSpPr>
-          <p:nvPr>
-            <p:ph idx="1"/>
-          </p:nvPr>
-        </p:nvSpPr>
-        <p:spPr>
-          <a:xfrm>
-            <a:off x="838200" y="1825624"/>
-            <a:ext cx="4853152" cy="4835479"/>
-          </a:xfrm>
-        </p:spPr>
-        <p:txBody>
-          <a:bodyPr>
-            <a:normAutofit/>
-          </a:bodyPr>
-          <a:lstStyle/>
-          <a:p>
-            <a:r>
-              <a:rPr lang="en-US" sz="3200" dirty="0"/>
-              <a:t>General form of a Class</a:t>
-            </a:r>
-            <a:r>
-              <a:rPr lang="en-US" sz="3200" dirty="0">
-                <a:solidFill>
-                  <a:schemeClr val="accent6"/>
-                </a:solidFill>
-              </a:rPr>
-              <a:t>:</a:t>
-            </a:r>
-            <a:endParaRPr lang="en-US" sz="2400" dirty="0">
-              <a:solidFill>
-                <a:schemeClr val="accent6"/>
-              </a:solidFill>
-            </a:endParaRPr>
-          </a:p>
-          <a:p>
-            <a:pPr lvl="1"/>
-            <a:r>
-              <a:rPr lang="en-US" sz="2800" dirty="0">
-                <a:solidFill>
-                  <a:srgbClr val="00FF00"/>
-                </a:solidFill>
-              </a:rPr>
-              <a:t>Class Name</a:t>
-            </a:r>
-          </a:p>
-          <a:p>
-            <a:pPr lvl="2"/>
-            <a:r>
-              <a:rPr lang="en-US" sz="2400" b="1" dirty="0">
-                <a:solidFill>
-                  <a:srgbClr val="00FF00"/>
-                </a:solidFill>
-              </a:rPr>
-              <a:t>CamelCase</a:t>
-            </a:r>
-          </a:p>
-          <a:p>
-            <a:pPr lvl="2"/>
-            <a:r>
-              <a:rPr lang="en-US" sz="2400" dirty="0">
-                <a:solidFill>
-                  <a:srgbClr val="00FF00"/>
-                </a:solidFill>
-              </a:rPr>
-              <a:t>CourseGrades</a:t>
-            </a:r>
-          </a:p>
-          <a:p>
-            <a:pPr lvl="2"/>
-            <a:r>
-              <a:rPr lang="en-US" sz="2400" dirty="0">
-                <a:solidFill>
-                  <a:srgbClr val="00FF00"/>
-                </a:solidFill>
-              </a:rPr>
-              <a:t>BankAccount</a:t>
-            </a:r>
-          </a:p>
-          <a:p>
-            <a:pPr lvl="2"/>
-            <a:r>
-              <a:rPr lang="en-US" sz="2400" dirty="0">
-                <a:solidFill>
-                  <a:srgbClr val="00FF00"/>
-                </a:solidFill>
-              </a:rPr>
-              <a:t>FlightStatus</a:t>
-            </a:r>
-          </a:p>
-          <a:p>
-            <a:pPr lvl="2"/>
-            <a:r>
-              <a:rPr lang="en-US" sz="2400" dirty="0">
-                <a:solidFill>
-                  <a:srgbClr val="00FF00"/>
-                </a:solidFill>
-              </a:rPr>
-              <a:t>XRayImage</a:t>
-            </a:r>
-          </a:p>
-          <a:p>
-            <a:pPr lvl="1"/>
-            <a:r>
-              <a:rPr lang="en-US" sz="2800" dirty="0">
-                <a:solidFill>
-                  <a:srgbClr val="FFD6AD"/>
-                </a:solidFill>
-              </a:rPr>
-              <a:t>Constructor</a:t>
-            </a:r>
-          </a:p>
-          <a:p>
-            <a:pPr lvl="1"/>
-            <a:r>
-              <a:rPr lang="en-US" sz="2800" dirty="0">
-                <a:solidFill>
-                  <a:srgbClr val="FF5050"/>
-                </a:solidFill>
-              </a:rPr>
-              <a:t>Methods</a:t>
-            </a:r>
-          </a:p>
-          <a:p>
-            <a:pPr lvl="1"/>
-            <a:endParaRPr lang="en-US" sz="2800" dirty="0">
-              <a:solidFill>
-                <a:schemeClr val="accent2"/>
-              </a:solidFill>
-            </a:endParaRPr>
-          </a:p>
-          <a:p>
-            <a:pPr lvl="1"/>
-            <a:endParaRPr lang="en-US" sz="2800" dirty="0">
-              <a:solidFill>
-                <a:schemeClr val="accent2"/>
-              </a:solidFill>
-            </a:endParaRPr>
           </a:p>
         </p:txBody>
       </p:sp>
@@ -19834,6 +20424,59 @@
       </p:sp>
       <p:sp>
         <p:nvSpPr>
+          <p:cNvPr id="5" name="Content Placeholder 2">
+            <a:extLst>
+              <a:ext uri="{FF2B5EF4-FFF2-40B4-BE49-F238E27FC236}">
+                <a16:creationId xmlns:a16="http://schemas.microsoft.com/office/drawing/2014/main" id="{F4E1B242-74FE-4433-A023-0912F16D8EEB}"/>
+              </a:ext>
+            </a:extLst>
+          </p:cNvPr>
+          <p:cNvSpPr>
+            <a:spLocks noGrp="1"/>
+          </p:cNvSpPr>
+          <p:nvPr>
+            <p:ph idx="1"/>
+          </p:nvPr>
+        </p:nvSpPr>
+        <p:spPr>
+          <a:xfrm>
+            <a:off x="838200" y="1825624"/>
+            <a:ext cx="4819281" cy="4835479"/>
+          </a:xfrm>
+        </p:spPr>
+        <p:txBody>
+          <a:bodyPr>
+            <a:normAutofit/>
+          </a:bodyPr>
+          <a:lstStyle/>
+          <a:p>
+            <a:r>
+              <a:rPr lang="en-US" b="1" dirty="0">
+                <a:solidFill>
+                  <a:srgbClr val="E00BE5"/>
+                </a:solidFill>
+              </a:rPr>
+              <a:t>self</a:t>
+            </a:r>
+          </a:p>
+          <a:p>
+            <a:r>
+              <a:rPr lang="en-US" dirty="0"/>
+              <a:t>Reference to the instance of the class inside of the class definition</a:t>
+            </a:r>
+            <a:r>
+              <a:rPr lang="en-US" dirty="0">
+                <a:solidFill>
+                  <a:schemeClr val="accent2"/>
+                </a:solidFill>
+              </a:rPr>
+              <a:t>.</a:t>
+            </a:r>
+          </a:p>
+        </p:txBody>
+      </p:sp>
+      <p:sp>
+        <p:nvSpPr>
           <p:cNvPr id="12" name="TextBox 11">
             <a:extLst>
               <a:ext uri="{FF2B5EF4-FFF2-40B4-BE49-F238E27FC236}">
@@ -20088,59 +20731,6 @@
                 <a:cs typeface="Courier New" panose="02070309020205020404" pitchFamily="49" charset="0"/>
               </a:rPr>
               <a:t>return self.x, self.y</a:t>
-            </a:r>
-          </a:p>
-        </p:txBody>
-      </p:sp>
-      <p:sp>
-        <p:nvSpPr>
-          <p:cNvPr id="5" name="Content Placeholder 2">
-            <a:extLst>
-              <a:ext uri="{FF2B5EF4-FFF2-40B4-BE49-F238E27FC236}">
-                <a16:creationId xmlns:a16="http://schemas.microsoft.com/office/drawing/2014/main" id="{F4E1B242-74FE-4433-A023-0912F16D8EEB}"/>
-              </a:ext>
-            </a:extLst>
-          </p:cNvPr>
-          <p:cNvSpPr>
-            <a:spLocks noGrp="1"/>
-          </p:cNvSpPr>
-          <p:nvPr>
-            <p:ph idx="1"/>
-          </p:nvPr>
-        </p:nvSpPr>
-        <p:spPr>
-          <a:xfrm>
-            <a:off x="838200" y="1825624"/>
-            <a:ext cx="4819281" cy="4835479"/>
-          </a:xfrm>
-        </p:spPr>
-        <p:txBody>
-          <a:bodyPr>
-            <a:normAutofit/>
-          </a:bodyPr>
-          <a:lstStyle/>
-          <a:p>
-            <a:r>
-              <a:rPr lang="en-US" b="1" dirty="0">
-                <a:solidFill>
-                  <a:srgbClr val="E00BE5"/>
-                </a:solidFill>
-              </a:rPr>
-              <a:t>self</a:t>
-            </a:r>
-          </a:p>
-          <a:p>
-            <a:r>
-              <a:rPr lang="en-US" dirty="0"/>
-              <a:t>Reference to the instance of the class inside of the class definition</a:t>
-            </a:r>
-            <a:r>
-              <a:rPr lang="en-US" dirty="0">
-                <a:solidFill>
-                  <a:schemeClr val="accent2"/>
-                </a:solidFill>
-              </a:rPr>
-              <a:t>.</a:t>
             </a:r>
           </a:p>
         </p:txBody>
@@ -20159,9 +20749,9 @@
 </file>
 
 <file path=ppt/theme/theme1.xml><?xml version="1.0" encoding="utf-8"?>
-<a:theme xmlns:a="http://schemas.openxmlformats.org/drawingml/2006/main" name="APS106_PPTX_Theme">
+<a:theme xmlns:a="http://schemas.openxmlformats.org/drawingml/2006/main" name="APS106_Theme">
   <a:themeElements>
-    <a:clrScheme name="Custom 5">
+    <a:clrScheme name="Custom 2">
       <a:dk1>
         <a:srgbClr val="444445"/>
       </a:dk1>
@@ -20175,13 +20765,13 @@
         <a:srgbClr val="3D464D"/>
       </a:lt2>
       <a:accent1>
-        <a:srgbClr val="017EE5"/>
+        <a:srgbClr val="0061FF"/>
       </a:accent1>
       <a:accent2>
-        <a:srgbClr val="017EE5"/>
+        <a:srgbClr val="0061FF"/>
       </a:accent2>
       <a:accent3>
-        <a:srgbClr val="017EE5"/>
+        <a:srgbClr val="0061FF"/>
       </a:accent3>
       <a:accent4>
         <a:srgbClr val="7B8994"/>
@@ -20190,7 +20780,7 @@
         <a:srgbClr val="7B8994"/>
       </a:accent5>
       <a:accent6>
-        <a:srgbClr val="FF9933"/>
+        <a:srgbClr val="F7B41A"/>
       </a:accent6>
       <a:hlink>
         <a:srgbClr val="3D464D"/>
@@ -20353,7 +20943,7 @@
   <a:extraClrSchemeLst/>
   <a:extLst>
     <a:ext uri="{05A4C25C-085E-4340-85A3-A5531E510DB2}">
-      <thm15:themeFamily xmlns:thm15="http://schemas.microsoft.com/office/thememl/2012/main" name="APS106_PPTX_Theme" id="{D71ABBE9-7E6D-4E30-BD8F-2EB61EB32A2D}" vid="{056030BA-02C6-4208-ACCE-F1B550CC0AA4}"/>
+      <thm15:themeFamily xmlns:thm15="http://schemas.microsoft.com/office/thememl/2012/main" name="APS106_Theme" id="{3BEEB87C-8A6C-443F-995D-4A4893CCEBD8}" vid="{9B7A7CDB-8752-4A8C-8C1A-92E8A921146E}"/>
     </a:ext>
   </a:extLst>
 </a:theme>

</xml_diff>